<commit_message>
updating title and explainer slides
</commit_message>
<xml_diff>
--- a/Roadmapper.pptx
+++ b/Roadmapper.pptx
@@ -5,8 +5,8 @@
     <p:sldMasterId id="2147483648" r:id="rId1"/>
   </p:sldMasterIdLst>
   <p:sldIdLst>
-    <p:sldId id="257" r:id="rId2"/>
-    <p:sldId id="264" r:id="rId3"/>
+    <p:sldId id="265" r:id="rId2"/>
+    <p:sldId id="266" r:id="rId3"/>
     <p:sldId id="258" r:id="rId4"/>
     <p:sldId id="259" r:id="rId5"/>
     <p:sldId id="260" r:id="rId6"/>
@@ -266,7 +266,7 @@
           <a:p>
             <a:fld id="{637403B5-9466-D943-85A6-7B5DD8B33077}" type="datetimeFigureOut">
               <a:rPr lang="en-US" smtClean="0"/>
-              <a:t>10/2/18</a:t>
+              <a:t>11/21/18</a:t>
             </a:fld>
             <a:endParaRPr lang="en-US"/>
           </a:p>
@@ -464,7 +464,7 @@
           <a:p>
             <a:fld id="{637403B5-9466-D943-85A6-7B5DD8B33077}" type="datetimeFigureOut">
               <a:rPr lang="en-US" smtClean="0"/>
-              <a:t>10/2/18</a:t>
+              <a:t>11/21/18</a:t>
             </a:fld>
             <a:endParaRPr lang="en-US"/>
           </a:p>
@@ -672,7 +672,7 @@
           <a:p>
             <a:fld id="{637403B5-9466-D943-85A6-7B5DD8B33077}" type="datetimeFigureOut">
               <a:rPr lang="en-US" smtClean="0"/>
-              <a:t>10/2/18</a:t>
+              <a:t>11/21/18</a:t>
             </a:fld>
             <a:endParaRPr lang="en-US"/>
           </a:p>
@@ -870,7 +870,7 @@
           <a:p>
             <a:fld id="{637403B5-9466-D943-85A6-7B5DD8B33077}" type="datetimeFigureOut">
               <a:rPr lang="en-US" smtClean="0"/>
-              <a:t>10/2/18</a:t>
+              <a:t>11/21/18</a:t>
             </a:fld>
             <a:endParaRPr lang="en-US"/>
           </a:p>
@@ -1145,7 +1145,7 @@
           <a:p>
             <a:fld id="{637403B5-9466-D943-85A6-7B5DD8B33077}" type="datetimeFigureOut">
               <a:rPr lang="en-US" smtClean="0"/>
-              <a:t>10/2/18</a:t>
+              <a:t>11/21/18</a:t>
             </a:fld>
             <a:endParaRPr lang="en-US"/>
           </a:p>
@@ -1410,7 +1410,7 @@
           <a:p>
             <a:fld id="{637403B5-9466-D943-85A6-7B5DD8B33077}" type="datetimeFigureOut">
               <a:rPr lang="en-US" smtClean="0"/>
-              <a:t>10/2/18</a:t>
+              <a:t>11/21/18</a:t>
             </a:fld>
             <a:endParaRPr lang="en-US"/>
           </a:p>
@@ -1822,7 +1822,7 @@
           <a:p>
             <a:fld id="{637403B5-9466-D943-85A6-7B5DD8B33077}" type="datetimeFigureOut">
               <a:rPr lang="en-US" smtClean="0"/>
-              <a:t>10/2/18</a:t>
+              <a:t>11/21/18</a:t>
             </a:fld>
             <a:endParaRPr lang="en-US"/>
           </a:p>
@@ -1963,7 +1963,7 @@
           <a:p>
             <a:fld id="{637403B5-9466-D943-85A6-7B5DD8B33077}" type="datetimeFigureOut">
               <a:rPr lang="en-US" smtClean="0"/>
-              <a:t>10/2/18</a:t>
+              <a:t>11/21/18</a:t>
             </a:fld>
             <a:endParaRPr lang="en-US"/>
           </a:p>
@@ -2076,7 +2076,7 @@
           <a:p>
             <a:fld id="{637403B5-9466-D943-85A6-7B5DD8B33077}" type="datetimeFigureOut">
               <a:rPr lang="en-US" smtClean="0"/>
-              <a:t>10/2/18</a:t>
+              <a:t>11/21/18</a:t>
             </a:fld>
             <a:endParaRPr lang="en-US"/>
           </a:p>
@@ -2387,7 +2387,7 @@
           <a:p>
             <a:fld id="{637403B5-9466-D943-85A6-7B5DD8B33077}" type="datetimeFigureOut">
               <a:rPr lang="en-US" smtClean="0"/>
-              <a:t>10/2/18</a:t>
+              <a:t>11/21/18</a:t>
             </a:fld>
             <a:endParaRPr lang="en-US"/>
           </a:p>
@@ -2675,7 +2675,7 @@
           <a:p>
             <a:fld id="{637403B5-9466-D943-85A6-7B5DD8B33077}" type="datetimeFigureOut">
               <a:rPr lang="en-US" smtClean="0"/>
-              <a:t>10/2/18</a:t>
+              <a:t>11/21/18</a:t>
             </a:fld>
             <a:endParaRPr lang="en-US"/>
           </a:p>
@@ -2916,7 +2916,7 @@
           <a:p>
             <a:fld id="{637403B5-9466-D943-85A6-7B5DD8B33077}" type="datetimeFigureOut">
               <a:rPr lang="en-US" smtClean="0"/>
-              <a:t>10/2/18</a:t>
+              <a:t>11/21/18</a:t>
             </a:fld>
             <a:endParaRPr lang="en-US"/>
           </a:p>
@@ -3335,10 +3335,10 @@
       </p:grpSpPr>
       <p:pic>
         <p:nvPicPr>
-          <p:cNvPr id="5" name="Picture 4">
-            <a:extLst>
-              <a:ext uri="{FF2B5EF4-FFF2-40B4-BE49-F238E27FC236}">
-                <a16:creationId xmlns:a16="http://schemas.microsoft.com/office/drawing/2014/main" id="{F6BCB409-5676-A945-B949-C4A495EF4B7C}"/>
+          <p:cNvPr id="3" name="Picture 2">
+            <a:extLst>
+              <a:ext uri="{FF2B5EF4-FFF2-40B4-BE49-F238E27FC236}">
+                <a16:creationId xmlns:a16="http://schemas.microsoft.com/office/drawing/2014/main" id="{62D18802-4E7C-944C-977E-CBBE58AC0074}"/>
               </a:ext>
             </a:extLst>
           </p:cNvPr>
@@ -3355,8 +3355,8 @@
         </p:blipFill>
         <p:spPr>
           <a:xfrm>
-            <a:off x="989047" y="6820"/>
-            <a:ext cx="10213907" cy="7892564"/>
+            <a:off x="989883" y="0"/>
+            <a:ext cx="10212235" cy="7891272"/>
           </a:xfrm>
           <a:prstGeom prst="rect">
             <a:avLst/>
@@ -3366,7 +3366,7 @@
     </p:spTree>
     <p:extLst>
       <p:ext uri="{BB962C8B-B14F-4D97-AF65-F5344CB8AC3E}">
-        <p14:creationId xmlns:p14="http://schemas.microsoft.com/office/powerpoint/2010/main" val="4158775149"/>
+        <p14:creationId xmlns:p14="http://schemas.microsoft.com/office/powerpoint/2010/main" val="2613127415"/>
       </p:ext>
     </p:extLst>
   </p:cSld>
@@ -3395,10 +3395,10 @@
       </p:grpSpPr>
       <p:pic>
         <p:nvPicPr>
-          <p:cNvPr id="5" name="Content Placeholder 4">
-            <a:extLst>
-              <a:ext uri="{FF2B5EF4-FFF2-40B4-BE49-F238E27FC236}">
-                <a16:creationId xmlns:a16="http://schemas.microsoft.com/office/drawing/2014/main" id="{C2BBB7FB-52F4-F946-A235-D2CD6AFDDA3C}"/>
+          <p:cNvPr id="6" name="Content Placeholder 5">
+            <a:extLst>
+              <a:ext uri="{FF2B5EF4-FFF2-40B4-BE49-F238E27FC236}">
+                <a16:creationId xmlns:a16="http://schemas.microsoft.com/office/drawing/2014/main" id="{FF56AF25-C24C-6A44-95FF-D705A0DE5563}"/>
               </a:ext>
             </a:extLst>
           </p:cNvPr>
@@ -3417,15 +3417,15 @@
         </p:blipFill>
         <p:spPr>
           <a:xfrm>
-            <a:off x="1787912" y="100023"/>
-            <a:ext cx="8616176" cy="6657955"/>
+            <a:off x="1788639" y="100359"/>
+            <a:ext cx="8614723" cy="6656832"/>
           </a:xfrm>
         </p:spPr>
       </p:pic>
     </p:spTree>
     <p:extLst>
       <p:ext uri="{BB962C8B-B14F-4D97-AF65-F5344CB8AC3E}">
-        <p14:creationId xmlns:p14="http://schemas.microsoft.com/office/powerpoint/2010/main" val="27385144"/>
+        <p14:creationId xmlns:p14="http://schemas.microsoft.com/office/powerpoint/2010/main" val="2215566507"/>
       </p:ext>
     </p:extLst>
   </p:cSld>

</xml_diff>